<commit_message>
Update user stories slides
</commit_message>
<xml_diff>
--- a/Slides/Module 01.2 User Stories.pptx
+++ b/Slides/Module 01.2 User Stories.pptx
@@ -3547,6 +3547,20 @@
               <a:rPr lang="en-US" dirty="0"/>
               <a:t>They do NOT directly describe the full behaviors of those capabilities.  For example: Under what circumstances should this capability be provided? What should happen if it can’t be provided?  These are details that will eventually need to be spelled out, but right now we want a bird's-eye view of the desired capabilities.</a:t>
             </a:r>
+          </a:p>
+          <a:p>
+            <a:endParaRPr lang="en-US" dirty="0"/>
+          </a:p>
+          <a:p>
+            <a:r>
+              <a:rPr lang="en-US" dirty="0"/>
+              <a:t>QUESTION: what are some ways that this user story can be fixed? (‘change the role to make sense’ is probably the easiest one, but maybe a teacher could get a benefit in their role as a teacher from access to a </a:t>
+            </a:r>
+            <a:r>
+              <a:rPr lang="en-US"/>
+              <a:t>laser cutter?)</a:t>
+            </a:r>
+            <a:endParaRPr lang="en-US" dirty="0"/>
           </a:p>
           <a:p>
             <a:endParaRPr lang="en-US" dirty="0"/>

</xml_diff>

<commit_message>
Post-meeting update with changes from Adeel
</commit_message>
<xml_diff>
--- a/Slides/Module 01.2 User Stories.pptx
+++ b/Slides/Module 01.2 User Stories.pptx
@@ -10,8 +10,8 @@
   <p:sldIdLst>
     <p:sldId id="485" r:id="rId2"/>
     <p:sldId id="548" r:id="rId3"/>
-    <p:sldId id="587" r:id="rId4"/>
-    <p:sldId id="397" r:id="rId5"/>
+    <p:sldId id="397" r:id="rId4"/>
+    <p:sldId id="587" r:id="rId5"/>
     <p:sldId id="575" r:id="rId6"/>
     <p:sldId id="576" r:id="rId7"/>
     <p:sldId id="550" r:id="rId8"/>
@@ -153,8 +153,8 @@
           <p14:sldIdLst>
             <p14:sldId id="485"/>
             <p14:sldId id="548"/>
+            <p14:sldId id="397"/>
             <p14:sldId id="587"/>
-            <p14:sldId id="397"/>
             <p14:sldId id="575"/>
             <p14:sldId id="576"/>
             <p14:sldId id="550"/>
@@ -271,7 +271,7 @@
           <a:p>
             <a:fld id="{7C7E5181-6CF5-45F7-A87A-E0E0B1FD7549}" type="datetimeFigureOut">
               <a:rPr lang="en-US" smtClean="0"/>
-              <a:t>12/29/25</a:t>
+              <a:t>12/30/25</a:t>
             </a:fld>
             <a:endParaRPr lang="en-US"/>
           </a:p>
@@ -2788,15 +2788,7 @@
           <a:p>
             <a:r>
               <a:rPr lang="en-US" dirty="0"/>
-              <a:t>On the project you get 100 points for delivering your MVP (the selected user stories and their essential COSs). The remaining 50 points come from implementing the desirable conditions of satisfaction for your selected user stories (or, possibly, from implementing an MVP for user stories on your </a:t>
-            </a:r>
-            <a:r>
-              <a:rPr lang="en-US" i="1" dirty="0"/>
-              <a:t>backlog</a:t>
-            </a:r>
-            <a:r>
-              <a:rPr lang="en-US" dirty="0"/>
-              <a:t>).</a:t>
+              <a:t>On the project you get 100 points for delivering your MVP (the selected user stories and their essential COSs). The remaining 50 points come from implementing the desirable conditions of satisfaction for your selected user stories.</a:t>
             </a:r>
           </a:p>
           <a:p>
@@ -2959,6 +2951,105 @@
   <p:cSld>
     <p:spTree>
       <p:nvGrpSpPr>
+        <p:cNvPr id="1" name=""/>
+        <p:cNvGrpSpPr/>
+        <p:nvPr/>
+      </p:nvGrpSpPr>
+      <p:grpSpPr>
+        <a:xfrm>
+          <a:off x="0" y="0"/>
+          <a:ext cx="0" cy="0"/>
+          <a:chOff x="0" y="0"/>
+          <a:chExt cx="0" cy="0"/>
+        </a:xfrm>
+      </p:grpSpPr>
+      <p:sp>
+        <p:nvSpPr>
+          <p:cNvPr id="2" name="Slide Image Placeholder 1"/>
+          <p:cNvSpPr>
+            <a:spLocks noGrp="1" noRot="1" noChangeAspect="1"/>
+          </p:cNvSpPr>
+          <p:nvPr>
+            <p:ph type="sldImg"/>
+          </p:nvPr>
+        </p:nvSpPr>
+        <p:spPr/>
+      </p:sp>
+      <p:sp>
+        <p:nvSpPr>
+          <p:cNvPr id="3" name="Notes Placeholder 2"/>
+          <p:cNvSpPr>
+            <a:spLocks noGrp="1"/>
+          </p:cNvSpPr>
+          <p:nvPr>
+            <p:ph type="body" idx="1"/>
+          </p:nvPr>
+        </p:nvSpPr>
+        <p:spPr/>
+        <p:txBody>
+          <a:bodyPr/>
+          <a:lstStyle/>
+          <a:p>
+            <a:r>
+              <a:rPr lang="en-US" dirty="0"/>
+              <a:t>The overall question for Requirements Gathering is making sure that we are building the right thing, which we’ll talk about more the next time we meet. </a:t>
+            </a:r>
+          </a:p>
+          <a:p>
+            <a:endParaRPr lang="en-US" dirty="0"/>
+          </a:p>
+          <a:p>
+            <a:r>
+              <a:rPr lang="en-US" dirty="0"/>
+              <a:t>This meme does a great job capturing the many ways in which we can get off course and end up building the wrong thing.</a:t>
+            </a:r>
+          </a:p>
+          <a:p>
+            <a:endParaRPr lang="en-US" dirty="0"/>
+          </a:p>
+        </p:txBody>
+      </p:sp>
+      <p:sp>
+        <p:nvSpPr>
+          <p:cNvPr id="4" name="Slide Number Placeholder 3"/>
+          <p:cNvSpPr>
+            <a:spLocks noGrp="1"/>
+          </p:cNvSpPr>
+          <p:nvPr>
+            <p:ph type="sldNum" sz="quarter" idx="5"/>
+          </p:nvPr>
+        </p:nvSpPr>
+        <p:spPr/>
+        <p:txBody>
+          <a:bodyPr/>
+          <a:lstStyle/>
+          <a:p>
+            <a:fld id="{07937F07-1250-4CCE-B198-1B2887014F41}" type="slidenum">
+              <a:rPr lang="en-US" smtClean="0"/>
+              <a:t>3</a:t>
+            </a:fld>
+            <a:endParaRPr lang="en-US" dirty="0"/>
+          </a:p>
+        </p:txBody>
+      </p:sp>
+    </p:spTree>
+    <p:extLst>
+      <p:ext uri="{BB962C8B-B14F-4D97-AF65-F5344CB8AC3E}">
+        <p14:creationId xmlns:p14="http://schemas.microsoft.com/office/powerpoint/2010/main" val="4169133123"/>
+      </p:ext>
+    </p:extLst>
+  </p:cSld>
+  <p:clrMapOvr>
+    <a:masterClrMapping/>
+  </p:clrMapOvr>
+</p:notes>
+</file>
+
+<file path=ppt/notesSlides/notesSlide4.xml><?xml version="1.0" encoding="utf-8"?>
+<p:notes xmlns:a="http://schemas.openxmlformats.org/drawingml/2006/main" xmlns:r="http://schemas.openxmlformats.org/officeDocument/2006/relationships" xmlns:p="http://schemas.openxmlformats.org/presentationml/2006/main">
+  <p:cSld>
+    <p:spTree>
+      <p:nvGrpSpPr>
         <p:cNvPr id="1" name="">
           <a:extLst>
             <a:ext uri="{FF2B5EF4-FFF2-40B4-BE49-F238E27FC236}">
@@ -3035,11 +3126,8 @@
             </a:pPr>
             <a:r>
               <a:rPr lang="en-US" dirty="0"/>
-              <a:t>User stories are </a:t>
-            </a:r>
-          </a:p>
-          <a:p>
-            <a:endParaRPr lang="en-US" dirty="0"/>
+              <a:t>User stories are a way of capturing the user’s stated goals in a way that hopefully helps us build the right thing — that’s the main topic for this lecture.</a:t>
+            </a:r>
           </a:p>
         </p:txBody>
       </p:sp>
@@ -3113,7 +3201,7 @@
                 <a:tabLst/>
                 <a:defRPr/>
               </a:pPr>
-              <a:t>3</a:t>
+              <a:t>4</a:t>
             </a:fld>
             <a:endParaRPr kumimoji="0" lang="en-US" sz="1200" b="0" i="0" u="none" strike="noStrike" kern="1200" cap="none" spc="0" normalizeH="0" baseline="0" noProof="0">
               <a:ln>
@@ -3136,105 +3224,6 @@
     <p:extLst>
       <p:ext uri="{BB962C8B-B14F-4D97-AF65-F5344CB8AC3E}">
         <p14:creationId xmlns:p14="http://schemas.microsoft.com/office/powerpoint/2010/main" val="2068627294"/>
-      </p:ext>
-    </p:extLst>
-  </p:cSld>
-  <p:clrMapOvr>
-    <a:masterClrMapping/>
-  </p:clrMapOvr>
-</p:notes>
-</file>
-
-<file path=ppt/notesSlides/notesSlide4.xml><?xml version="1.0" encoding="utf-8"?>
-<p:notes xmlns:a="http://schemas.openxmlformats.org/drawingml/2006/main" xmlns:r="http://schemas.openxmlformats.org/officeDocument/2006/relationships" xmlns:p="http://schemas.openxmlformats.org/presentationml/2006/main">
-  <p:cSld>
-    <p:spTree>
-      <p:nvGrpSpPr>
-        <p:cNvPr id="1" name=""/>
-        <p:cNvGrpSpPr/>
-        <p:nvPr/>
-      </p:nvGrpSpPr>
-      <p:grpSpPr>
-        <a:xfrm>
-          <a:off x="0" y="0"/>
-          <a:ext cx="0" cy="0"/>
-          <a:chOff x="0" y="0"/>
-          <a:chExt cx="0" cy="0"/>
-        </a:xfrm>
-      </p:grpSpPr>
-      <p:sp>
-        <p:nvSpPr>
-          <p:cNvPr id="2" name="Slide Image Placeholder 1"/>
-          <p:cNvSpPr>
-            <a:spLocks noGrp="1" noRot="1" noChangeAspect="1"/>
-          </p:cNvSpPr>
-          <p:nvPr>
-            <p:ph type="sldImg"/>
-          </p:nvPr>
-        </p:nvSpPr>
-        <p:spPr/>
-      </p:sp>
-      <p:sp>
-        <p:nvSpPr>
-          <p:cNvPr id="3" name="Notes Placeholder 2"/>
-          <p:cNvSpPr>
-            <a:spLocks noGrp="1"/>
-          </p:cNvSpPr>
-          <p:nvPr>
-            <p:ph type="body" idx="1"/>
-          </p:nvPr>
-        </p:nvSpPr>
-        <p:spPr/>
-        <p:txBody>
-          <a:bodyPr/>
-          <a:lstStyle/>
-          <a:p>
-            <a:r>
-              <a:rPr lang="en-US" dirty="0"/>
-              <a:t>The overall question for Requirements Gathering is making sure that we are building the right thing, which we’ll talk about more the next time we meet. </a:t>
-            </a:r>
-          </a:p>
-          <a:p>
-            <a:endParaRPr lang="en-US" dirty="0"/>
-          </a:p>
-          <a:p>
-            <a:r>
-              <a:rPr lang="en-US" dirty="0"/>
-              <a:t>This meme does a great job capturing the many ways in which we can get off course and end up building the wrong thing.</a:t>
-            </a:r>
-          </a:p>
-          <a:p>
-            <a:endParaRPr lang="en-US" dirty="0"/>
-          </a:p>
-        </p:txBody>
-      </p:sp>
-      <p:sp>
-        <p:nvSpPr>
-          <p:cNvPr id="4" name="Slide Number Placeholder 3"/>
-          <p:cNvSpPr>
-            <a:spLocks noGrp="1"/>
-          </p:cNvSpPr>
-          <p:nvPr>
-            <p:ph type="sldNum" sz="quarter" idx="5"/>
-          </p:nvPr>
-        </p:nvSpPr>
-        <p:spPr/>
-        <p:txBody>
-          <a:bodyPr/>
-          <a:lstStyle/>
-          <a:p>
-            <a:fld id="{07937F07-1250-4CCE-B198-1B2887014F41}" type="slidenum">
-              <a:rPr lang="en-US" smtClean="0"/>
-              <a:t>4</a:t>
-            </a:fld>
-            <a:endParaRPr lang="en-US" dirty="0"/>
-          </a:p>
-        </p:txBody>
-      </p:sp>
-    </p:spTree>
-    <p:extLst>
-      <p:ext uri="{BB962C8B-B14F-4D97-AF65-F5344CB8AC3E}">
-        <p14:creationId xmlns:p14="http://schemas.microsoft.com/office/powerpoint/2010/main" val="4169133123"/>
       </p:ext>
     </p:extLst>
   </p:cSld>
@@ -4165,13 +4154,8 @@
           <a:p>
             <a:r>
               <a:rPr lang="en-US" dirty="0"/>
-              <a:t>QUESTION: what are some ways that this user story can be fixed? (‘change the role to make sense’ is probably the easiest one, but maybe a teacher could get a benefit in their role as a teacher from access to a </a:t>
-            </a:r>
-            <a:r>
-              <a:rPr lang="en-US"/>
-              <a:t>laser cutter?)</a:t>
-            </a:r>
-            <a:endParaRPr lang="en-US" dirty="0"/>
+              <a:t>QUESTION: what are some ways that this user story can be fixed? (‘change the role to make sense’ is probably the easiest one, but maybe a teacher could get a benefit in their role as a teacher from access to a laser cutter?)</a:t>
+            </a:r>
           </a:p>
           <a:p>
             <a:endParaRPr lang="en-US" dirty="0"/>
@@ -4368,7 +4352,7 @@
           <a:p>
             <a:fld id="{5D2A64DE-480B-420F-9649-4F8E696E08E0}" type="datetime1">
               <a:rPr lang="en-US" smtClean="0"/>
-              <a:t>12/29/25</a:t>
+              <a:t>12/30/25</a:t>
             </a:fld>
             <a:endParaRPr lang="en-US"/>
           </a:p>
@@ -4692,7 +4676,7 @@
           <a:p>
             <a:fld id="{EA476A42-A091-4468-A075-64A31BE59948}" type="datetime1">
               <a:rPr lang="en-US" smtClean="0"/>
-              <a:t>12/29/25</a:t>
+              <a:t>12/30/25</a:t>
             </a:fld>
             <a:endParaRPr lang="en-US"/>
           </a:p>
@@ -4890,7 +4874,7 @@
           <a:p>
             <a:fld id="{0D3616D0-8311-4107-9726-6B805E7D05BA}" type="datetime1">
               <a:rPr lang="en-US" smtClean="0"/>
-              <a:t>12/29/25</a:t>
+              <a:t>12/30/25</a:t>
             </a:fld>
             <a:endParaRPr lang="en-US"/>
           </a:p>
@@ -5098,7 +5082,7 @@
           <a:p>
             <a:fld id="{3BC2557A-5C88-417A-A763-5AC779462A5F}" type="datetime1">
               <a:rPr lang="en-US" smtClean="0"/>
-              <a:t>12/29/25</a:t>
+              <a:t>12/30/25</a:t>
             </a:fld>
             <a:endParaRPr lang="en-US"/>
           </a:p>
@@ -5622,7 +5606,7 @@
           <a:p>
             <a:fld id="{07C7BFD4-467E-4EDE-93EA-052F5B39A4E5}" type="datetime1">
               <a:rPr lang="en-US" smtClean="0"/>
-              <a:t>12/29/25</a:t>
+              <a:t>12/30/25</a:t>
             </a:fld>
             <a:endParaRPr lang="en-US"/>
           </a:p>
@@ -5872,7 +5856,7 @@
           <a:p>
             <a:fld id="{07C7BFD4-467E-4EDE-93EA-052F5B39A4E5}" type="datetime1">
               <a:rPr lang="en-US" smtClean="0"/>
-              <a:t>12/29/25</a:t>
+              <a:t>12/30/25</a:t>
             </a:fld>
             <a:endParaRPr lang="en-US"/>
           </a:p>
@@ -6054,7 +6038,7 @@
           <a:p>
             <a:fld id="{109E55A0-C911-4F03-82FC-7E5926047D46}" type="datetime1">
               <a:rPr lang="en-US" smtClean="0"/>
-              <a:t>12/29/25</a:t>
+              <a:t>12/30/25</a:t>
             </a:fld>
             <a:endParaRPr lang="en-US"/>
           </a:p>
@@ -6367,7 +6351,7 @@
           <a:p>
             <a:fld id="{A533CBE2-D5BE-47AC-ADC2-9CDFC1D0CF90}" type="datetime1">
               <a:rPr lang="en-US" smtClean="0"/>
-              <a:t>12/29/25</a:t>
+              <a:t>12/30/25</a:t>
             </a:fld>
             <a:endParaRPr lang="en-US"/>
           </a:p>
@@ -6668,7 +6652,7 @@
           <a:p>
             <a:fld id="{39B7EDB1-CE74-4951-85A2-0B01C2128E28}" type="datetime1">
               <a:rPr lang="en-US" smtClean="0"/>
-              <a:t>12/29/25</a:t>
+              <a:t>12/30/25</a:t>
             </a:fld>
             <a:endParaRPr lang="en-US"/>
           </a:p>
@@ -7116,7 +7100,7 @@
           <a:p>
             <a:fld id="{2BC7EB92-A5C2-4807-A9DC-9EDE6CBFB241}" type="datetime1">
               <a:rPr lang="en-US" smtClean="0"/>
-              <a:t>12/29/25</a:t>
+              <a:t>12/30/25</a:t>
             </a:fld>
             <a:endParaRPr lang="en-US"/>
           </a:p>
@@ -7229,7 +7213,7 @@
           <a:p>
             <a:fld id="{2B7B7EE0-7771-4CD5-9B2B-3550753A54A1}" type="datetime1">
               <a:rPr lang="en-US" smtClean="0"/>
-              <a:t>12/29/25</a:t>
+              <a:t>12/30/25</a:t>
             </a:fld>
             <a:endParaRPr lang="en-US"/>
           </a:p>
@@ -7540,7 +7524,7 @@
           <a:p>
             <a:fld id="{F8B318B3-0E87-4416-A9B8-D891968C2727}" type="datetime1">
               <a:rPr lang="en-US" smtClean="0"/>
-              <a:t>12/29/25</a:t>
+              <a:t>12/30/25</a:t>
             </a:fld>
             <a:endParaRPr lang="en-US"/>
           </a:p>
@@ -7781,7 +7765,7 @@
           <a:p>
             <a:fld id="{54D997E8-DDEE-43F1-8D9B-F8A1E11DE488}" type="datetime1">
               <a:rPr lang="en-US" smtClean="0"/>
-              <a:t>12/29/25</a:t>
+              <a:t>12/30/25</a:t>
             </a:fld>
             <a:endParaRPr lang="en-US"/>
           </a:p>
@@ -9247,7 +9231,7 @@
           <a:p>
             <a:r>
               <a:rPr lang="en-US" dirty="0"/>
-              <a:t>Good examples:</a:t>
+              <a:t>Good Examples of User Stories</a:t>
             </a:r>
           </a:p>
         </p:txBody>
@@ -9594,8 +9578,8 @@
           <a:lstStyle/>
           <a:p>
             <a:r>
-              <a:rPr lang="en-US"/>
-              <a:t>Priorities</a:t>
+              <a:rPr lang="en-US" dirty="0"/>
+              <a:t>Conditions of Satisfaction Have Priorities</a:t>
             </a:r>
           </a:p>
         </p:txBody>
@@ -12753,6 +12737,149 @@
   <p:cSld>
     <p:spTree>
       <p:nvGrpSpPr>
+        <p:cNvPr id="1" name=""/>
+        <p:cNvGrpSpPr/>
+        <p:nvPr/>
+      </p:nvGrpSpPr>
+      <p:grpSpPr>
+        <a:xfrm>
+          <a:off x="0" y="0"/>
+          <a:ext cx="0" cy="0"/>
+          <a:chOff x="0" y="0"/>
+          <a:chExt cx="0" cy="0"/>
+        </a:xfrm>
+      </p:grpSpPr>
+      <p:sp>
+        <p:nvSpPr>
+          <p:cNvPr id="2" name="Title 1">
+            <a:extLst>
+              <a:ext uri="{FF2B5EF4-FFF2-40B4-BE49-F238E27FC236}">
+                <a16:creationId xmlns:a16="http://schemas.microsoft.com/office/drawing/2014/main" id="{EE06A195-BA59-40E7-8521-87B75EE15054}"/>
+              </a:ext>
+            </a:extLst>
+          </p:cNvPr>
+          <p:cNvSpPr>
+            <a:spLocks noGrp="1"/>
+          </p:cNvSpPr>
+          <p:nvPr>
+            <p:ph type="title"/>
+          </p:nvPr>
+        </p:nvSpPr>
+        <p:spPr/>
+        <p:txBody>
+          <a:bodyPr>
+            <a:normAutofit/>
+          </a:bodyPr>
+          <a:lstStyle/>
+          <a:p>
+            <a:r>
+              <a:rPr lang="en-US" dirty="0"/>
+              <a:t>User stories come from</a:t>
+            </a:r>
+            <a:br>
+              <a:rPr lang="en-US" dirty="0"/>
+            </a:br>
+            <a:r>
+              <a:rPr lang="en-US" dirty="0"/>
+              <a:t>analyzing the user’s requirements</a:t>
+            </a:r>
+          </a:p>
+        </p:txBody>
+      </p:sp>
+      <p:sp>
+        <p:nvSpPr>
+          <p:cNvPr id="4" name="Slide Number Placeholder 3">
+            <a:extLst>
+              <a:ext uri="{FF2B5EF4-FFF2-40B4-BE49-F238E27FC236}">
+                <a16:creationId xmlns:a16="http://schemas.microsoft.com/office/drawing/2014/main" id="{2257FCDD-253D-4273-9467-54F4E684C4C6}"/>
+              </a:ext>
+            </a:extLst>
+          </p:cNvPr>
+          <p:cNvSpPr>
+            <a:spLocks noGrp="1"/>
+          </p:cNvSpPr>
+          <p:nvPr>
+            <p:ph type="sldNum" sz="quarter" idx="12"/>
+          </p:nvPr>
+        </p:nvSpPr>
+        <p:spPr/>
+        <p:txBody>
+          <a:bodyPr/>
+          <a:lstStyle/>
+          <a:p>
+            <a:fld id="{20F37917-FD3A-4669-9018-DA04BCDD3D75}" type="slidenum">
+              <a:rPr lang="en-US" smtClean="0"/>
+              <a:t>3</a:t>
+            </a:fld>
+            <a:endParaRPr lang="en-US" dirty="0"/>
+          </a:p>
+        </p:txBody>
+      </p:sp>
+      <p:pic>
+        <p:nvPicPr>
+          <p:cNvPr id="1028" name="Picture 4">
+            <a:extLst>
+              <a:ext uri="{FF2B5EF4-FFF2-40B4-BE49-F238E27FC236}">
+                <a16:creationId xmlns:a16="http://schemas.microsoft.com/office/drawing/2014/main" id="{1540FDF9-740E-4147-9A42-ABFE3E325AB3}"/>
+              </a:ext>
+            </a:extLst>
+          </p:cNvPr>
+          <p:cNvPicPr>
+            <a:picLocks noChangeAspect="1" noChangeArrowheads="1"/>
+          </p:cNvPicPr>
+          <p:nvPr/>
+        </p:nvPicPr>
+        <p:blipFill>
+          <a:blip r:embed="rId3">
+            <a:extLst>
+              <a:ext uri="{28A0092B-C50C-407E-A947-70E740481C1C}">
+                <a14:useLocalDpi xmlns:a14="http://schemas.microsoft.com/office/drawing/2010/main" val="0"/>
+              </a:ext>
+            </a:extLst>
+          </a:blip>
+          <a:srcRect/>
+          <a:stretch>
+            <a:fillRect/>
+          </a:stretch>
+        </p:blipFill>
+        <p:spPr bwMode="auto">
+          <a:xfrm>
+            <a:off x="2159000" y="1968500"/>
+            <a:ext cx="7874000" cy="2921000"/>
+          </a:xfrm>
+          <a:prstGeom prst="rect">
+            <a:avLst/>
+          </a:prstGeom>
+          <a:noFill/>
+          <a:extLst>
+            <a:ext uri="{909E8E84-426E-40DD-AFC4-6F175D3DCCD1}">
+              <a14:hiddenFill xmlns:a14="http://schemas.microsoft.com/office/drawing/2010/main">
+                <a:solidFill>
+                  <a:srgbClr val="FFFFFF"/>
+                </a:solidFill>
+              </a14:hiddenFill>
+            </a:ext>
+          </a:extLst>
+        </p:spPr>
+      </p:pic>
+    </p:spTree>
+    <p:extLst>
+      <p:ext uri="{BB962C8B-B14F-4D97-AF65-F5344CB8AC3E}">
+        <p14:creationId xmlns:p14="http://schemas.microsoft.com/office/powerpoint/2010/main" val="3346099260"/>
+      </p:ext>
+    </p:extLst>
+  </p:cSld>
+  <p:clrMapOvr>
+    <a:masterClrMapping/>
+  </p:clrMapOvr>
+</p:sld>
+</file>
+
+<file path=ppt/slides/slide4.xml><?xml version="1.0" encoding="utf-8"?>
+<p:sld xmlns:a="http://schemas.openxmlformats.org/drawingml/2006/main" xmlns:r="http://schemas.openxmlformats.org/officeDocument/2006/relationships" xmlns:p="http://schemas.openxmlformats.org/presentationml/2006/main">
+  <p:cSld>
+    <p:spTree>
+      <p:nvGrpSpPr>
         <p:cNvPr id="1" name="">
           <a:extLst>
             <a:ext uri="{FF2B5EF4-FFF2-40B4-BE49-F238E27FC236}">
@@ -12888,7 +13015,7 @@
                 <a:tabLst/>
                 <a:defRPr/>
               </a:pPr>
-              <a:t>3</a:t>
+              <a:t>4</a:t>
             </a:fld>
             <a:endParaRPr kumimoji="0" lang="en-US" sz="1200" b="0" i="0" u="none" strike="noStrike" kern="1200" cap="none" spc="0" normalizeH="0" baseline="0" noProof="0">
               <a:ln>
@@ -13116,149 +13243,6 @@
 </p:sld>
 </file>
 
-<file path=ppt/slides/slide4.xml><?xml version="1.0" encoding="utf-8"?>
-<p:sld xmlns:a="http://schemas.openxmlformats.org/drawingml/2006/main" xmlns:r="http://schemas.openxmlformats.org/officeDocument/2006/relationships" xmlns:p="http://schemas.openxmlformats.org/presentationml/2006/main">
-  <p:cSld>
-    <p:spTree>
-      <p:nvGrpSpPr>
-        <p:cNvPr id="1" name=""/>
-        <p:cNvGrpSpPr/>
-        <p:nvPr/>
-      </p:nvGrpSpPr>
-      <p:grpSpPr>
-        <a:xfrm>
-          <a:off x="0" y="0"/>
-          <a:ext cx="0" cy="0"/>
-          <a:chOff x="0" y="0"/>
-          <a:chExt cx="0" cy="0"/>
-        </a:xfrm>
-      </p:grpSpPr>
-      <p:sp>
-        <p:nvSpPr>
-          <p:cNvPr id="2" name="Title 1">
-            <a:extLst>
-              <a:ext uri="{FF2B5EF4-FFF2-40B4-BE49-F238E27FC236}">
-                <a16:creationId xmlns:a16="http://schemas.microsoft.com/office/drawing/2014/main" id="{EE06A195-BA59-40E7-8521-87B75EE15054}"/>
-              </a:ext>
-            </a:extLst>
-          </p:cNvPr>
-          <p:cNvSpPr>
-            <a:spLocks noGrp="1"/>
-          </p:cNvSpPr>
-          <p:nvPr>
-            <p:ph type="title"/>
-          </p:nvPr>
-        </p:nvSpPr>
-        <p:spPr/>
-        <p:txBody>
-          <a:bodyPr>
-            <a:normAutofit/>
-          </a:bodyPr>
-          <a:lstStyle/>
-          <a:p>
-            <a:r>
-              <a:rPr lang="en-US" dirty="0"/>
-              <a:t>User stories come from</a:t>
-            </a:r>
-            <a:br>
-              <a:rPr lang="en-US" dirty="0"/>
-            </a:br>
-            <a:r>
-              <a:rPr lang="en-US" dirty="0"/>
-              <a:t>analyzing the user’s requirements</a:t>
-            </a:r>
-          </a:p>
-        </p:txBody>
-      </p:sp>
-      <p:sp>
-        <p:nvSpPr>
-          <p:cNvPr id="4" name="Slide Number Placeholder 3">
-            <a:extLst>
-              <a:ext uri="{FF2B5EF4-FFF2-40B4-BE49-F238E27FC236}">
-                <a16:creationId xmlns:a16="http://schemas.microsoft.com/office/drawing/2014/main" id="{2257FCDD-253D-4273-9467-54F4E684C4C6}"/>
-              </a:ext>
-            </a:extLst>
-          </p:cNvPr>
-          <p:cNvSpPr>
-            <a:spLocks noGrp="1"/>
-          </p:cNvSpPr>
-          <p:nvPr>
-            <p:ph type="sldNum" sz="quarter" idx="12"/>
-          </p:nvPr>
-        </p:nvSpPr>
-        <p:spPr/>
-        <p:txBody>
-          <a:bodyPr/>
-          <a:lstStyle/>
-          <a:p>
-            <a:fld id="{20F37917-FD3A-4669-9018-DA04BCDD3D75}" type="slidenum">
-              <a:rPr lang="en-US" smtClean="0"/>
-              <a:t>4</a:t>
-            </a:fld>
-            <a:endParaRPr lang="en-US" dirty="0"/>
-          </a:p>
-        </p:txBody>
-      </p:sp>
-      <p:pic>
-        <p:nvPicPr>
-          <p:cNvPr id="1028" name="Picture 4">
-            <a:extLst>
-              <a:ext uri="{FF2B5EF4-FFF2-40B4-BE49-F238E27FC236}">
-                <a16:creationId xmlns:a16="http://schemas.microsoft.com/office/drawing/2014/main" id="{1540FDF9-740E-4147-9A42-ABFE3E325AB3}"/>
-              </a:ext>
-            </a:extLst>
-          </p:cNvPr>
-          <p:cNvPicPr>
-            <a:picLocks noChangeAspect="1" noChangeArrowheads="1"/>
-          </p:cNvPicPr>
-          <p:nvPr/>
-        </p:nvPicPr>
-        <p:blipFill>
-          <a:blip r:embed="rId3">
-            <a:extLst>
-              <a:ext uri="{28A0092B-C50C-407E-A947-70E740481C1C}">
-                <a14:useLocalDpi xmlns:a14="http://schemas.microsoft.com/office/drawing/2010/main" val="0"/>
-              </a:ext>
-            </a:extLst>
-          </a:blip>
-          <a:srcRect/>
-          <a:stretch>
-            <a:fillRect/>
-          </a:stretch>
-        </p:blipFill>
-        <p:spPr bwMode="auto">
-          <a:xfrm>
-            <a:off x="2159000" y="1968500"/>
-            <a:ext cx="7874000" cy="2921000"/>
-          </a:xfrm>
-          <a:prstGeom prst="rect">
-            <a:avLst/>
-          </a:prstGeom>
-          <a:noFill/>
-          <a:extLst>
-            <a:ext uri="{909E8E84-426E-40DD-AFC4-6F175D3DCCD1}">
-              <a14:hiddenFill xmlns:a14="http://schemas.microsoft.com/office/drawing/2010/main">
-                <a:solidFill>
-                  <a:srgbClr val="FFFFFF"/>
-                </a:solidFill>
-              </a14:hiddenFill>
-            </a:ext>
-          </a:extLst>
-        </p:spPr>
-      </p:pic>
-    </p:spTree>
-    <p:extLst>
-      <p:ext uri="{BB962C8B-B14F-4D97-AF65-F5344CB8AC3E}">
-        <p14:creationId xmlns:p14="http://schemas.microsoft.com/office/powerpoint/2010/main" val="3346099260"/>
-      </p:ext>
-    </p:extLst>
-  </p:cSld>
-  <p:clrMapOvr>
-    <a:masterClrMapping/>
-  </p:clrMapOvr>
-</p:sld>
-</file>
-
 <file path=ppt/slides/slide5.xml><?xml version="1.0" encoding="utf-8"?>
 <p:sld xmlns:a="http://schemas.openxmlformats.org/drawingml/2006/main" xmlns:r="http://schemas.openxmlformats.org/officeDocument/2006/relationships" xmlns:p="http://schemas.openxmlformats.org/presentationml/2006/main">
   <p:cSld>
@@ -13310,7 +13294,7 @@
           <a:p>
             <a:r>
               <a:rPr lang="en-US" dirty="0"/>
-              <a:t>What are user stories?</a:t>
+              <a:t>User stories: format</a:t>
             </a:r>
           </a:p>
         </p:txBody>
@@ -13348,11 +13332,7 @@
               <a:t>…the least-common-denominator approach documenting the requirements of users when </a:t>
             </a:r>
             <a:r>
-              <a:rPr lang="en-US" b="1" dirty="0">
-                <a:solidFill>
-                  <a:srgbClr val="0070C0"/>
-                </a:solidFill>
-              </a:rPr>
+              <a:rPr lang="en-US" b="1" dirty="0"/>
               <a:t>planning</a:t>
             </a:r>
             <a:r>
@@ -13366,11 +13346,7 @@
               <a:t>…a tool tool for keeping large collaborative teams on the same page when </a:t>
             </a:r>
             <a:r>
-              <a:rPr lang="en-US" b="1" dirty="0">
-                <a:solidFill>
-                  <a:srgbClr val="00B0F0"/>
-                </a:solidFill>
-              </a:rPr>
+              <a:rPr lang="en-US" b="1" dirty="0"/>
               <a:t>organizing</a:t>
             </a:r>
             <a:r>
@@ -13684,6 +13660,36 @@
       </p:grpSpPr>
       <p:sp>
         <p:nvSpPr>
+          <p:cNvPr id="2" name="Title 1">
+            <a:extLst>
+              <a:ext uri="{FF2B5EF4-FFF2-40B4-BE49-F238E27FC236}">
+                <a16:creationId xmlns:a16="http://schemas.microsoft.com/office/drawing/2014/main" id="{CDEF265F-50FB-BF39-3F8D-EA0187855738}"/>
+              </a:ext>
+            </a:extLst>
+          </p:cNvPr>
+          <p:cNvSpPr>
+            <a:spLocks noGrp="1"/>
+          </p:cNvSpPr>
+          <p:nvPr>
+            <p:ph type="title"/>
+          </p:nvPr>
+        </p:nvSpPr>
+        <p:spPr/>
+        <p:txBody>
+          <a:bodyPr>
+            <a:noAutofit/>
+          </a:bodyPr>
+          <a:lstStyle/>
+          <a:p>
+            <a:r>
+              <a:rPr lang="en-US" dirty="0"/>
+              <a:t>User stories in software engineering</a:t>
+            </a:r>
+          </a:p>
+        </p:txBody>
+      </p:sp>
+      <p:sp>
+        <p:nvSpPr>
           <p:cNvPr id="4" name="Slide Number Placeholder 3">
             <a:extLst>
               <a:ext uri="{FF2B5EF4-FFF2-40B4-BE49-F238E27FC236}">
@@ -13698,12 +13704,7 @@
             <p:ph type="sldNum" sz="quarter" idx="12"/>
           </p:nvPr>
         </p:nvSpPr>
-        <p:spPr>
-          <a:xfrm>
-            <a:off x="8610600" y="6356350"/>
-            <a:ext cx="2743200" cy="365125"/>
-          </a:xfrm>
-        </p:spPr>
+        <p:spPr/>
         <p:txBody>
           <a:bodyPr>
             <a:normAutofit/>
@@ -13779,41 +13780,6 @@
               <a:ea typeface="+mn-ea"/>
               <a:cs typeface="+mn-cs"/>
             </a:endParaRPr>
-          </a:p>
-        </p:txBody>
-      </p:sp>
-      <p:sp>
-        <p:nvSpPr>
-          <p:cNvPr id="2" name="Title 1">
-            <a:extLst>
-              <a:ext uri="{FF2B5EF4-FFF2-40B4-BE49-F238E27FC236}">
-                <a16:creationId xmlns:a16="http://schemas.microsoft.com/office/drawing/2014/main" id="{CDEF265F-50FB-BF39-3F8D-EA0187855738}"/>
-              </a:ext>
-            </a:extLst>
-          </p:cNvPr>
-          <p:cNvSpPr>
-            <a:spLocks noGrp="1"/>
-          </p:cNvSpPr>
-          <p:nvPr>
-            <p:ph type="title"/>
-          </p:nvPr>
-        </p:nvSpPr>
-        <p:spPr>
-          <a:xfrm>
-            <a:off x="838200" y="18255"/>
-            <a:ext cx="10515600" cy="1325563"/>
-          </a:xfrm>
-        </p:spPr>
-        <p:txBody>
-          <a:bodyPr>
-            <a:noAutofit/>
-          </a:bodyPr>
-          <a:lstStyle/>
-          <a:p>
-            <a:r>
-              <a:rPr lang="en-US"/>
-              <a:t>Where do user stories fit in?</a:t>
-            </a:r>
           </a:p>
         </p:txBody>
       </p:sp>

</xml_diff>

<commit_message>
added tutorial links on module 01 page
</commit_message>
<xml_diff>
--- a/Slides/Module 01.2 User Stories.pptx
+++ b/Slides/Module 01.2 User Stories.pptx
@@ -271,7 +271,7 @@
           <a:p>
             <a:fld id="{7C7E5181-6CF5-45F7-A87A-E0E0B1FD7549}" type="datetimeFigureOut">
               <a:rPr lang="en-US" smtClean="0"/>
-              <a:t>1/1/26</a:t>
+              <a:t>1/4/2026</a:t>
             </a:fld>
             <a:endParaRPr lang="en-US"/>
           </a:p>
@@ -4420,7 +4420,7 @@
           <a:p>
             <a:fld id="{5D2A64DE-480B-420F-9649-4F8E696E08E0}" type="datetime1">
               <a:rPr lang="en-US" smtClean="0"/>
-              <a:t>1/1/26</a:t>
+              <a:t>1/4/2026</a:t>
             </a:fld>
             <a:endParaRPr lang="en-US"/>
           </a:p>
@@ -4744,7 +4744,7 @@
           <a:p>
             <a:fld id="{EA476A42-A091-4468-A075-64A31BE59948}" type="datetime1">
               <a:rPr lang="en-US" smtClean="0"/>
-              <a:t>1/1/26</a:t>
+              <a:t>1/4/2026</a:t>
             </a:fld>
             <a:endParaRPr lang="en-US"/>
           </a:p>
@@ -4942,7 +4942,7 @@
           <a:p>
             <a:fld id="{0D3616D0-8311-4107-9726-6B805E7D05BA}" type="datetime1">
               <a:rPr lang="en-US" smtClean="0"/>
-              <a:t>1/1/26</a:t>
+              <a:t>1/4/2026</a:t>
             </a:fld>
             <a:endParaRPr lang="en-US"/>
           </a:p>
@@ -5150,7 +5150,7 @@
           <a:p>
             <a:fld id="{3BC2557A-5C88-417A-A763-5AC779462A5F}" type="datetime1">
               <a:rPr lang="en-US" smtClean="0"/>
-              <a:t>1/1/26</a:t>
+              <a:t>1/4/2026</a:t>
             </a:fld>
             <a:endParaRPr lang="en-US"/>
           </a:p>
@@ -5674,7 +5674,7 @@
           <a:p>
             <a:fld id="{07C7BFD4-467E-4EDE-93EA-052F5B39A4E5}" type="datetime1">
               <a:rPr lang="en-US" smtClean="0"/>
-              <a:t>1/1/26</a:t>
+              <a:t>1/4/2026</a:t>
             </a:fld>
             <a:endParaRPr lang="en-US"/>
           </a:p>
@@ -5924,7 +5924,7 @@
           <a:p>
             <a:fld id="{07C7BFD4-467E-4EDE-93EA-052F5B39A4E5}" type="datetime1">
               <a:rPr lang="en-US" smtClean="0"/>
-              <a:t>1/1/26</a:t>
+              <a:t>1/4/2026</a:t>
             </a:fld>
             <a:endParaRPr lang="en-US"/>
           </a:p>
@@ -6106,7 +6106,7 @@
           <a:p>
             <a:fld id="{109E55A0-C911-4F03-82FC-7E5926047D46}" type="datetime1">
               <a:rPr lang="en-US" smtClean="0"/>
-              <a:t>1/1/26</a:t>
+              <a:t>1/4/2026</a:t>
             </a:fld>
             <a:endParaRPr lang="en-US"/>
           </a:p>
@@ -6419,7 +6419,7 @@
           <a:p>
             <a:fld id="{A533CBE2-D5BE-47AC-ADC2-9CDFC1D0CF90}" type="datetime1">
               <a:rPr lang="en-US" smtClean="0"/>
-              <a:t>1/1/26</a:t>
+              <a:t>1/4/2026</a:t>
             </a:fld>
             <a:endParaRPr lang="en-US"/>
           </a:p>
@@ -6720,7 +6720,7 @@
           <a:p>
             <a:fld id="{39B7EDB1-CE74-4951-85A2-0B01C2128E28}" type="datetime1">
               <a:rPr lang="en-US" smtClean="0"/>
-              <a:t>1/1/26</a:t>
+              <a:t>1/4/2026</a:t>
             </a:fld>
             <a:endParaRPr lang="en-US"/>
           </a:p>
@@ -7168,7 +7168,7 @@
           <a:p>
             <a:fld id="{2BC7EB92-A5C2-4807-A9DC-9EDE6CBFB241}" type="datetime1">
               <a:rPr lang="en-US" smtClean="0"/>
-              <a:t>1/1/26</a:t>
+              <a:t>1/4/2026</a:t>
             </a:fld>
             <a:endParaRPr lang="en-US"/>
           </a:p>
@@ -7281,7 +7281,7 @@
           <a:p>
             <a:fld id="{2B7B7EE0-7771-4CD5-9B2B-3550753A54A1}" type="datetime1">
               <a:rPr lang="en-US" smtClean="0"/>
-              <a:t>1/1/26</a:t>
+              <a:t>1/4/2026</a:t>
             </a:fld>
             <a:endParaRPr lang="en-US"/>
           </a:p>
@@ -7592,7 +7592,7 @@
           <a:p>
             <a:fld id="{F8B318B3-0E87-4416-A9B8-D891968C2727}" type="datetime1">
               <a:rPr lang="en-US" smtClean="0"/>
-              <a:t>1/1/26</a:t>
+              <a:t>1/4/2026</a:t>
             </a:fld>
             <a:endParaRPr lang="en-US"/>
           </a:p>
@@ -7833,7 +7833,7 @@
           <a:p>
             <a:fld id="{54D997E8-DDEE-43F1-8D9B-F8A1E11DE488}" type="datetime1">
               <a:rPr lang="en-US" smtClean="0"/>
-              <a:t>1/1/26</a:t>
+              <a:t>1/4/2026</a:t>
             </a:fld>
             <a:endParaRPr lang="en-US"/>
           </a:p>
@@ -8530,7 +8530,7 @@
         <p:spPr>
           <a:xfrm>
             <a:off x="838200" y="1500160"/>
-            <a:ext cx="7887346" cy="4351338"/>
+            <a:ext cx="8412678" cy="4351338"/>
           </a:xfrm>
         </p:spPr>
         <p:txBody>
@@ -12917,8 +12917,8 @@
         </p:blipFill>
         <p:spPr bwMode="auto">
           <a:xfrm>
-            <a:off x="2159000" y="1968500"/>
-            <a:ext cx="7874000" cy="2921000"/>
+            <a:off x="1250395" y="1730992"/>
+            <a:ext cx="10103405" cy="3748037"/>
           </a:xfrm>
           <a:prstGeom prst="rect">
             <a:avLst/>

</xml_diff>

<commit_message>
tweaked slides for M01.2, M02.2
</commit_message>
<xml_diff>
--- a/Slides/Module 01.2 User Stories.pptx
+++ b/Slides/Module 01.2 User Stories.pptx
@@ -271,7 +271,7 @@
           <a:p>
             <a:fld id="{7C7E5181-6CF5-45F7-A87A-E0E0B1FD7549}" type="datetimeFigureOut">
               <a:rPr lang="en-US" smtClean="0"/>
-              <a:t>1/4/2026</a:t>
+              <a:t>1/7/2026</a:t>
             </a:fld>
             <a:endParaRPr lang="en-US"/>
           </a:p>
@@ -1772,8 +1772,101 @@
           <a:lstStyle/>
           <a:p>
             <a:r>
-              <a:rPr lang="en-US"/>
+              <a:rPr lang="en-US" dirty="0"/>
+              <a:t>Q: What's the benefit here?</a:t>
+            </a:r>
+          </a:p>
+        </p:txBody>
+      </p:sp>
+      <p:sp>
+        <p:nvSpPr>
+          <p:cNvPr id="4" name="Slide Number Placeholder 3"/>
+          <p:cNvSpPr>
+            <a:spLocks noGrp="1"/>
+          </p:cNvSpPr>
+          <p:nvPr>
+            <p:ph type="sldNum" sz="quarter" idx="5"/>
+          </p:nvPr>
+        </p:nvSpPr>
+        <p:spPr/>
+        <p:txBody>
+          <a:bodyPr/>
+          <a:lstStyle/>
+          <a:p>
+            <a:fld id="{07937F07-1250-4CCE-B198-1B2887014F41}" type="slidenum">
+              <a:rPr lang="en-US" smtClean="0"/>
+              <a:t>19</a:t>
+            </a:fld>
+            <a:endParaRPr lang="en-US"/>
+          </a:p>
+        </p:txBody>
+      </p:sp>
+    </p:spTree>
+    <p:extLst>
+      <p:ext uri="{BB962C8B-B14F-4D97-AF65-F5344CB8AC3E}">
+        <p14:creationId xmlns:p14="http://schemas.microsoft.com/office/powerpoint/2010/main" val="432076141"/>
+      </p:ext>
+    </p:extLst>
+  </p:cSld>
+  <p:clrMapOvr>
+    <a:masterClrMapping/>
+  </p:clrMapOvr>
+</p:notes>
+</file>
+
+<file path=ppt/notesSlides/notesSlide18.xml><?xml version="1.0" encoding="utf-8"?>
+<p:notes xmlns:a="http://schemas.openxmlformats.org/drawingml/2006/main" xmlns:r="http://schemas.openxmlformats.org/officeDocument/2006/relationships" xmlns:p="http://schemas.openxmlformats.org/presentationml/2006/main">
+  <p:cSld>
+    <p:spTree>
+      <p:nvGrpSpPr>
+        <p:cNvPr id="1" name=""/>
+        <p:cNvGrpSpPr/>
+        <p:nvPr/>
+      </p:nvGrpSpPr>
+      <p:grpSpPr>
+        <a:xfrm>
+          <a:off x="0" y="0"/>
+          <a:ext cx="0" cy="0"/>
+          <a:chOff x="0" y="0"/>
+          <a:chExt cx="0" cy="0"/>
+        </a:xfrm>
+      </p:grpSpPr>
+      <p:sp>
+        <p:nvSpPr>
+          <p:cNvPr id="2" name="Slide Image Placeholder 1"/>
+          <p:cNvSpPr>
+            <a:spLocks noGrp="1" noRot="1" noChangeAspect="1"/>
+          </p:cNvSpPr>
+          <p:nvPr>
+            <p:ph type="sldImg"/>
+          </p:nvPr>
+        </p:nvSpPr>
+        <p:spPr/>
+      </p:sp>
+      <p:sp>
+        <p:nvSpPr>
+          <p:cNvPr id="3" name="Notes Placeholder 2"/>
+          <p:cNvSpPr>
+            <a:spLocks noGrp="1"/>
+          </p:cNvSpPr>
+          <p:nvPr>
+            <p:ph type="body" idx="1"/>
+          </p:nvPr>
+        </p:nvSpPr>
+        <p:spPr/>
+        <p:txBody>
+          <a:bodyPr/>
+          <a:lstStyle/>
+          <a:p>
+            <a:r>
+              <a:rPr lang="en-US" dirty="0"/>
               <a:t>Maybe this is desirable, maybe it's essential.</a:t>
+            </a:r>
+          </a:p>
+          <a:p>
+            <a:r>
+              <a:rPr lang="en-US" dirty="0"/>
+              <a:t>Q: What's the benefit to the maintenance supervisor?</a:t>
             </a:r>
           </a:p>
         </p:txBody>
@@ -1874,224 +1967,6 @@
 </p:notes>
 </file>
 
-<file path=ppt/notesSlides/notesSlide18.xml><?xml version="1.0" encoding="utf-8"?>
-<p:notes xmlns:a="http://schemas.openxmlformats.org/drawingml/2006/main" xmlns:r="http://schemas.openxmlformats.org/officeDocument/2006/relationships" xmlns:p="http://schemas.openxmlformats.org/presentationml/2006/main">
-  <p:cSld>
-    <p:spTree>
-      <p:nvGrpSpPr>
-        <p:cNvPr id="1" name=""/>
-        <p:cNvGrpSpPr/>
-        <p:nvPr/>
-      </p:nvGrpSpPr>
-      <p:grpSpPr>
-        <a:xfrm>
-          <a:off x="0" y="0"/>
-          <a:ext cx="0" cy="0"/>
-          <a:chOff x="0" y="0"/>
-          <a:chExt cx="0" cy="0"/>
-        </a:xfrm>
-      </p:grpSpPr>
-      <p:sp>
-        <p:nvSpPr>
-          <p:cNvPr id="2" name="Slide Image Placeholder 1"/>
-          <p:cNvSpPr>
-            <a:spLocks noGrp="1" noRot="1" noChangeAspect="1"/>
-          </p:cNvSpPr>
-          <p:nvPr>
-            <p:ph type="sldImg"/>
-          </p:nvPr>
-        </p:nvSpPr>
-        <p:spPr/>
-      </p:sp>
-      <p:sp>
-        <p:nvSpPr>
-          <p:cNvPr id="3" name="Notes Placeholder 2"/>
-          <p:cNvSpPr>
-            <a:spLocks noGrp="1"/>
-          </p:cNvSpPr>
-          <p:nvPr>
-            <p:ph type="body" idx="1"/>
-          </p:nvPr>
-        </p:nvSpPr>
-        <p:spPr/>
-        <p:txBody>
-          <a:bodyPr/>
-          <a:lstStyle/>
-          <a:p>
-            <a:r>
-              <a:rPr lang="en-US" dirty="0"/>
-              <a:t>INVEST is a popular mnemonic for describing what makes a good user story  (INVEST is widely used-- we've added the E because we think it's important)</a:t>
-            </a:r>
-          </a:p>
-          <a:p>
-            <a:endParaRPr lang="en-US" dirty="0"/>
-          </a:p>
-          <a:p>
-            <a:r>
-              <a:rPr lang="en-US" dirty="0"/>
-              <a:t>Independent – Stories should not be coupled between each other, except where obviously necessary. Want to make it so that a user can examine a story on its own</a:t>
-            </a:r>
-          </a:p>
-          <a:p>
-            <a:br>
-              <a:rPr lang="en-US" dirty="0"/>
-            </a:br>
-            <a:r>
-              <a:rPr lang="en-US" dirty="0"/>
-              <a:t>Negotiable – Best stories are result of a negotiation between a client and a developer – how do we come to some mutual agreement about what we are going to build, and why? Goal is to develop what the customer needs</a:t>
-            </a:r>
-          </a:p>
-          <a:p>
-            <a:endParaRPr lang="en-US" dirty="0"/>
-          </a:p>
-          <a:p>
-            <a:r>
-              <a:rPr lang="en-US" dirty="0"/>
-              <a:t>Valuable – Each story should have some benefit that the client can recognize. Value might include value to your business, not just value to the user.</a:t>
-            </a:r>
-          </a:p>
-          <a:p>
-            <a:endParaRPr lang="en-US" dirty="0"/>
-          </a:p>
-          <a:p>
-            <a:r>
-              <a:rPr lang="en-US" dirty="0"/>
-              <a:t>Estimable (that is, </a:t>
-            </a:r>
-            <a:r>
-              <a:rPr lang="en-US" dirty="0" err="1"/>
-              <a:t>estimatable</a:t>
-            </a:r>
-            <a:r>
-              <a:rPr lang="en-US" dirty="0"/>
-              <a:t>) – As we will see in a bit, being able to estimate how long it will take to implement a user story is key to determining a reasonable scope for your project</a:t>
-            </a:r>
-          </a:p>
-          <a:p>
-            <a:endParaRPr lang="en-US" dirty="0"/>
-          </a:p>
-          <a:p>
-            <a:r>
-              <a:rPr lang="en-US" dirty="0"/>
-              <a:t>Small – In  the real world, a rule of thumb is to average 3-4 days of work per story for a full-time developer.  For our projects, it might be something a single student might be able to accomplish in a week, along with their other obligations as a student.</a:t>
-            </a:r>
-          </a:p>
-          <a:p>
-            <a:endParaRPr lang="en-US" dirty="0"/>
-          </a:p>
-          <a:p>
-            <a:r>
-              <a:rPr lang="en-US" dirty="0"/>
-              <a:t>Testable – There must be some way to judge completion: for the person implementing the software, and for the end-user. </a:t>
-            </a:r>
-          </a:p>
-          <a:p>
-            <a:endParaRPr lang="en-US" dirty="0"/>
-          </a:p>
-          <a:p>
-            <a:r>
-              <a:rPr lang="en-US" dirty="0"/>
-              <a:t>These </a:t>
-            </a:r>
-            <a:r>
-              <a:rPr lang="en-US" dirty="0" err="1"/>
-              <a:t>critera</a:t>
-            </a:r>
-            <a:r>
-              <a:rPr lang="en-US" dirty="0"/>
-              <a:t> tell you whether a user story is good at the </a:t>
-            </a:r>
-            <a:r>
-              <a:rPr lang="en-US" i="1" dirty="0"/>
-              <a:t>organizational level — </a:t>
-            </a:r>
-            <a:r>
-              <a:rPr lang="en-US" i="0" dirty="0"/>
-              <a:t>whether it’s useful to organize a software project. “Good” here doesn’t mean that the user story is worth doing, or ethical</a:t>
-            </a:r>
-            <a:endParaRPr lang="en-US" dirty="0"/>
-          </a:p>
-          <a:p>
-            <a:r>
-              <a:rPr lang="en-US" dirty="0"/>
-              <a:t>https://</a:t>
-            </a:r>
-            <a:r>
-              <a:rPr lang="en-US" dirty="0" err="1"/>
-              <a:t>agileforall.com</a:t>
-            </a:r>
-            <a:r>
-              <a:rPr lang="en-US" dirty="0"/>
-              <a:t>/new-to-agile-invest-in-good-user-stories/</a:t>
-            </a:r>
-          </a:p>
-          <a:p>
-            <a:endParaRPr lang="en-US" dirty="0"/>
-          </a:p>
-          <a:p>
-            <a:endParaRPr lang="en-US" dirty="0"/>
-          </a:p>
-          <a:p>
-            <a:pPr marL="0" marR="0" lvl="0" indent="0" algn="l" defTabSz="914400" rtl="0" eaLnBrk="1" fontAlgn="auto" latinLnBrk="0" hangingPunct="1">
-              <a:lnSpc>
-                <a:spcPct val="100000"/>
-              </a:lnSpc>
-              <a:spcBef>
-                <a:spcPts val="0"/>
-              </a:spcBef>
-              <a:spcAft>
-                <a:spcPts val="0"/>
-              </a:spcAft>
-              <a:buClrTx/>
-              <a:buSzTx/>
-              <a:buFontTx/>
-              <a:buNone/>
-              <a:tabLst/>
-              <a:defRPr/>
-            </a:pPr>
-            <a:r>
-              <a:rPr lang="en-US" dirty="0"/>
-              <a:t>… Let’s see an example and work through some of the tricky bits</a:t>
-            </a:r>
-          </a:p>
-        </p:txBody>
-      </p:sp>
-      <p:sp>
-        <p:nvSpPr>
-          <p:cNvPr id="4" name="Slide Number Placeholder 3"/>
-          <p:cNvSpPr>
-            <a:spLocks noGrp="1"/>
-          </p:cNvSpPr>
-          <p:nvPr>
-            <p:ph type="sldNum" sz="quarter" idx="5"/>
-          </p:nvPr>
-        </p:nvSpPr>
-        <p:spPr/>
-        <p:txBody>
-          <a:bodyPr/>
-          <a:lstStyle/>
-          <a:p>
-            <a:fld id="{07937F07-1250-4CCE-B198-1B2887014F41}" type="slidenum">
-              <a:rPr lang="en-US" smtClean="0"/>
-              <a:t>23</a:t>
-            </a:fld>
-            <a:endParaRPr lang="en-US"/>
-          </a:p>
-        </p:txBody>
-      </p:sp>
-    </p:spTree>
-    <p:extLst>
-      <p:ext uri="{BB962C8B-B14F-4D97-AF65-F5344CB8AC3E}">
-        <p14:creationId xmlns:p14="http://schemas.microsoft.com/office/powerpoint/2010/main" val="1695675977"/>
-      </p:ext>
-    </p:extLst>
-  </p:cSld>
-  <p:clrMapOvr>
-    <a:masterClrMapping/>
-  </p:clrMapOvr>
-</p:notes>
-</file>
-
 <file path=ppt/notesSlides/notesSlide19.xml><?xml version="1.0" encoding="utf-8"?>
 <p:notes xmlns:a="http://schemas.openxmlformats.org/drawingml/2006/main" xmlns:r="http://schemas.openxmlformats.org/officeDocument/2006/relationships" xmlns:p="http://schemas.openxmlformats.org/presentationml/2006/main">
   <p:cSld>
@@ -2136,225 +2011,35 @@
           <a:bodyPr/>
           <a:lstStyle/>
           <a:p>
-            <a:pPr marL="0" marR="0" lvl="0" indent="0" algn="l" defTabSz="914400" rtl="0" eaLnBrk="1" fontAlgn="auto" latinLnBrk="0" hangingPunct="1">
-              <a:lnSpc>
-                <a:spcPct val="100000"/>
-              </a:lnSpc>
-              <a:spcBef>
-                <a:spcPts val="0"/>
-              </a:spcBef>
-              <a:spcAft>
-                <a:spcPts val="0"/>
-              </a:spcAft>
-              <a:buClrTx/>
-              <a:buSzTx/>
-              <a:buFontTx/>
-              <a:buNone/>
-              <a:tabLst/>
-              <a:defRPr/>
-            </a:pPr>
-            <a:r>
-              <a:rPr lang="en-US" sz="3600" dirty="0"/>
-              <a:t>What we've talked about so far are called "functional requirements"-- the minimum functions that a system must be able to perform.</a:t>
-            </a:r>
-          </a:p>
-          <a:p>
-            <a:pPr marL="0" marR="0" lvl="0" indent="0" algn="l" defTabSz="914400" rtl="0" eaLnBrk="1" fontAlgn="auto" latinLnBrk="0" hangingPunct="1">
-              <a:lnSpc>
-                <a:spcPct val="100000"/>
-              </a:lnSpc>
-              <a:spcBef>
-                <a:spcPts val="0"/>
-              </a:spcBef>
-              <a:spcAft>
-                <a:spcPts val="0"/>
-              </a:spcAft>
-              <a:buClrTx/>
-              <a:buSzTx/>
-              <a:buFontTx/>
-              <a:buNone/>
-              <a:tabLst/>
-              <a:defRPr/>
-            </a:pPr>
-            <a:endParaRPr lang="en-US" sz="3600" dirty="0"/>
-          </a:p>
-          <a:p>
-            <a:pPr marL="0" marR="0" lvl="0" indent="0" algn="l" defTabSz="914400" rtl="0" eaLnBrk="1" fontAlgn="auto" latinLnBrk="0" hangingPunct="1">
-              <a:lnSpc>
-                <a:spcPct val="100000"/>
-              </a:lnSpc>
-              <a:spcBef>
-                <a:spcPts val="0"/>
-              </a:spcBef>
-              <a:spcAft>
-                <a:spcPts val="0"/>
-              </a:spcAft>
-              <a:buClrTx/>
-              <a:buSzTx/>
-              <a:buFontTx/>
-              <a:buNone/>
-              <a:tabLst/>
-              <a:defRPr/>
-            </a:pPr>
-            <a:r>
-              <a:rPr lang="en-US" sz="3600" dirty="0"/>
-              <a:t>But there are other kinds of requirements.  These are called "non-functional" requirements.</a:t>
-            </a:r>
-          </a:p>
-          <a:p>
-            <a:pPr marL="0" marR="0" lvl="0" indent="0" algn="l" defTabSz="914400" rtl="0" eaLnBrk="1" fontAlgn="auto" latinLnBrk="0" hangingPunct="1">
-              <a:lnSpc>
-                <a:spcPct val="100000"/>
-              </a:lnSpc>
-              <a:spcBef>
-                <a:spcPts val="0"/>
-              </a:spcBef>
-              <a:spcAft>
-                <a:spcPts val="0"/>
-              </a:spcAft>
-              <a:buClrTx/>
-              <a:buSzTx/>
-              <a:buFontTx/>
-              <a:buNone/>
-              <a:tabLst/>
-              <a:defRPr/>
-            </a:pPr>
-            <a:endParaRPr lang="en-US" sz="3600" dirty="0"/>
-          </a:p>
-          <a:p>
-            <a:pPr marL="0" marR="0" lvl="0" indent="0" algn="l" defTabSz="914400" rtl="0" eaLnBrk="1" fontAlgn="auto" latinLnBrk="0" hangingPunct="1">
-              <a:lnSpc>
-                <a:spcPct val="100000"/>
-              </a:lnSpc>
-              <a:spcBef>
-                <a:spcPts val="0"/>
-              </a:spcBef>
-              <a:spcAft>
-                <a:spcPts val="0"/>
-              </a:spcAft>
-              <a:buClrTx/>
-              <a:buSzTx/>
-              <a:buFontTx/>
-              <a:buNone/>
-              <a:tabLst/>
-              <a:defRPr/>
-            </a:pPr>
-            <a:r>
-              <a:rPr lang="en-US" sz="3600" dirty="0"/>
-              <a:t>Non-functional requirements capture the </a:t>
-            </a:r>
-            <a:r>
-              <a:rPr lang="en-US" sz="3600" i="1" dirty="0"/>
-              <a:t>quality goals</a:t>
-            </a:r>
-            <a:r>
-              <a:rPr lang="en-US" sz="3600" i="0" dirty="0"/>
-              <a:t> of a system. </a:t>
-            </a:r>
-            <a:endParaRPr lang="en-US" sz="3600" dirty="0"/>
-          </a:p>
-          <a:p>
-            <a:pPr marL="0" marR="0" lvl="0" indent="0" algn="l" defTabSz="914400" rtl="0" eaLnBrk="1" fontAlgn="auto" latinLnBrk="0" hangingPunct="1">
-              <a:lnSpc>
-                <a:spcPct val="100000"/>
-              </a:lnSpc>
-              <a:spcBef>
-                <a:spcPts val="0"/>
-              </a:spcBef>
-              <a:spcAft>
-                <a:spcPts val="0"/>
-              </a:spcAft>
-              <a:buClrTx/>
-              <a:buSzTx/>
-              <a:buFontTx/>
-              <a:buNone/>
-              <a:tabLst/>
-              <a:defRPr/>
-            </a:pPr>
-            <a:endParaRPr lang="en-US" sz="3600" dirty="0"/>
-          </a:p>
-          <a:p>
-            <a:pPr marL="0" marR="0" lvl="0" indent="0" algn="l" defTabSz="914400" rtl="0" eaLnBrk="1" fontAlgn="auto" latinLnBrk="0" hangingPunct="1">
-              <a:lnSpc>
-                <a:spcPct val="100000"/>
-              </a:lnSpc>
-              <a:spcBef>
-                <a:spcPts val="0"/>
-              </a:spcBef>
-              <a:spcAft>
-                <a:spcPts val="0"/>
-              </a:spcAft>
-              <a:buClrTx/>
-              <a:buSzTx/>
-              <a:buFontTx/>
-              <a:buNone/>
-              <a:tabLst/>
-              <a:defRPr/>
-            </a:pPr>
-            <a:r>
-              <a:rPr lang="en-US" sz="3600" dirty="0"/>
-              <a:t>Here are some obvious ones  &lt;read slide&gt;</a:t>
-            </a:r>
-          </a:p>
-          <a:p>
-            <a:pPr marL="0" marR="0" lvl="0" indent="0" algn="l" defTabSz="914400" rtl="0" eaLnBrk="1" fontAlgn="auto" latinLnBrk="0" hangingPunct="1">
-              <a:lnSpc>
-                <a:spcPct val="100000"/>
-              </a:lnSpc>
-              <a:spcBef>
-                <a:spcPts val="0"/>
-              </a:spcBef>
-              <a:spcAft>
-                <a:spcPts val="0"/>
-              </a:spcAft>
-              <a:buClrTx/>
-              <a:buSzTx/>
-              <a:buFontTx/>
-              <a:buNone/>
-              <a:tabLst/>
-              <a:defRPr/>
-            </a:pPr>
-            <a:endParaRPr lang="en-US" sz="3600" dirty="0"/>
-          </a:p>
-          <a:p>
-            <a:pPr marL="0" marR="0" lvl="0" indent="0" algn="l" defTabSz="914400" rtl="0" eaLnBrk="1" fontAlgn="auto" latinLnBrk="0" hangingPunct="1">
-              <a:lnSpc>
-                <a:spcPct val="100000"/>
-              </a:lnSpc>
-              <a:spcBef>
-                <a:spcPts val="0"/>
-              </a:spcBef>
-              <a:spcAft>
-                <a:spcPts val="0"/>
-              </a:spcAft>
-              <a:buClrTx/>
-              <a:buSzTx/>
-              <a:buFontTx/>
-              <a:buNone/>
-              <a:tabLst/>
-              <a:defRPr/>
-            </a:pPr>
-            <a:endParaRPr lang="en-US" sz="3600" dirty="0"/>
-          </a:p>
-          <a:p>
-            <a:pPr marL="0" marR="0" lvl="0" indent="0" algn="l" defTabSz="914400" rtl="0" eaLnBrk="1" fontAlgn="auto" latinLnBrk="0" hangingPunct="1">
-              <a:lnSpc>
-                <a:spcPct val="100000"/>
-              </a:lnSpc>
-              <a:spcBef>
-                <a:spcPts val="0"/>
-              </a:spcBef>
-              <a:spcAft>
-                <a:spcPts val="0"/>
-              </a:spcAft>
-              <a:buClrTx/>
-              <a:buSzTx/>
-              <a:buFontTx/>
-              <a:buNone/>
-              <a:tabLst/>
-              <a:defRPr/>
-            </a:pPr>
-            <a:endParaRPr lang="en-US" sz="3600" dirty="0"/>
+            <a:r>
+              <a:rPr lang="en-US" dirty="0"/>
+              <a:t>Discussion: do these </a:t>
+            </a:r>
+            <a:r>
+              <a:rPr lang="en-US" dirty="0" err="1"/>
+              <a:t>CoS</a:t>
+            </a:r>
+            <a:r>
+              <a:rPr lang="en-US" dirty="0"/>
+              <a:t> pertain to the supervisor's desire to /control/ the order in which the potholes are repaired?   </a:t>
+            </a:r>
+          </a:p>
+          <a:p>
+            <a:endParaRPr lang="en-US" dirty="0"/>
+          </a:p>
+          <a:p>
+            <a:r>
+              <a:rPr lang="en-US" dirty="0"/>
+              <a:t>Prof. Wand says: these COS are about "planning" the order in which the potholes should be repaired, but it doesn't give him any _control_. If he wants to **control** the order, shouldn't there be a </a:t>
+            </a:r>
+            <a:r>
+              <a:rPr lang="en-US" dirty="0" err="1"/>
+              <a:t>CoS</a:t>
+            </a:r>
+            <a:r>
+              <a:rPr lang="en-US" dirty="0"/>
+              <a:t> something like "I should be able to assign each repair crew an individual set of potholes, and communicate this assignment to the crew"?? </a:t>
+            </a:r>
           </a:p>
         </p:txBody>
       </p:sp>
@@ -2375,16 +2060,16 @@
           <a:p>
             <a:fld id="{07937F07-1250-4CCE-B198-1B2887014F41}" type="slidenum">
               <a:rPr lang="en-US" smtClean="0"/>
-              <a:t>24</a:t>
+              <a:t>22</a:t>
             </a:fld>
-            <a:endParaRPr lang="en-US" dirty="0"/>
+            <a:endParaRPr lang="en-US"/>
           </a:p>
         </p:txBody>
       </p:sp>
     </p:spTree>
     <p:extLst>
       <p:ext uri="{BB962C8B-B14F-4D97-AF65-F5344CB8AC3E}">
-        <p14:creationId xmlns:p14="http://schemas.microsoft.com/office/powerpoint/2010/main" val="1345260318"/>
+        <p14:creationId xmlns:p14="http://schemas.microsoft.com/office/powerpoint/2010/main" val="3525442661"/>
       </p:ext>
     </p:extLst>
   </p:cSld>
@@ -2479,6 +2164,526 @@
 </file>
 
 <file path=ppt/notesSlides/notesSlide20.xml><?xml version="1.0" encoding="utf-8"?>
+<p:notes xmlns:a="http://schemas.openxmlformats.org/drawingml/2006/main" xmlns:r="http://schemas.openxmlformats.org/officeDocument/2006/relationships" xmlns:p="http://schemas.openxmlformats.org/presentationml/2006/main">
+  <p:cSld>
+    <p:spTree>
+      <p:nvGrpSpPr>
+        <p:cNvPr id="1" name=""/>
+        <p:cNvGrpSpPr/>
+        <p:nvPr/>
+      </p:nvGrpSpPr>
+      <p:grpSpPr>
+        <a:xfrm>
+          <a:off x="0" y="0"/>
+          <a:ext cx="0" cy="0"/>
+          <a:chOff x="0" y="0"/>
+          <a:chExt cx="0" cy="0"/>
+        </a:xfrm>
+      </p:grpSpPr>
+      <p:sp>
+        <p:nvSpPr>
+          <p:cNvPr id="2" name="Slide Image Placeholder 1"/>
+          <p:cNvSpPr>
+            <a:spLocks noGrp="1" noRot="1" noChangeAspect="1"/>
+          </p:cNvSpPr>
+          <p:nvPr>
+            <p:ph type="sldImg"/>
+          </p:nvPr>
+        </p:nvSpPr>
+        <p:spPr/>
+      </p:sp>
+      <p:sp>
+        <p:nvSpPr>
+          <p:cNvPr id="3" name="Notes Placeholder 2"/>
+          <p:cNvSpPr>
+            <a:spLocks noGrp="1"/>
+          </p:cNvSpPr>
+          <p:nvPr>
+            <p:ph type="body" idx="1"/>
+          </p:nvPr>
+        </p:nvSpPr>
+        <p:spPr/>
+        <p:txBody>
+          <a:bodyPr/>
+          <a:lstStyle/>
+          <a:p>
+            <a:r>
+              <a:rPr lang="en-US" dirty="0"/>
+              <a:t>INVEST is a popular mnemonic for describing what makes a good user story  (INVEST is widely used-- we've added the E because we think it's important)</a:t>
+            </a:r>
+          </a:p>
+          <a:p>
+            <a:endParaRPr lang="en-US" dirty="0"/>
+          </a:p>
+          <a:p>
+            <a:r>
+              <a:rPr lang="en-US" dirty="0"/>
+              <a:t>Independent – Stories should not be coupled between each other, except where obviously necessary. Want to make it so that a user can examine a story on its own</a:t>
+            </a:r>
+          </a:p>
+          <a:p>
+            <a:br>
+              <a:rPr lang="en-US" dirty="0"/>
+            </a:br>
+            <a:r>
+              <a:rPr lang="en-US" dirty="0"/>
+              <a:t>Negotiable – Best stories are result of a negotiation between a client and a developer – how do we come to some mutual agreement about what we are going to build, and why? Goal is to develop what the customer needs</a:t>
+            </a:r>
+          </a:p>
+          <a:p>
+            <a:endParaRPr lang="en-US" dirty="0"/>
+          </a:p>
+          <a:p>
+            <a:r>
+              <a:rPr lang="en-US" dirty="0"/>
+              <a:t>Valuable – Each story should have some benefit that the client can recognize. Value might include value to your business, not just value to the user.</a:t>
+            </a:r>
+          </a:p>
+          <a:p>
+            <a:endParaRPr lang="en-US" dirty="0"/>
+          </a:p>
+          <a:p>
+            <a:r>
+              <a:rPr lang="en-US" dirty="0"/>
+              <a:t>Estimable (that is, </a:t>
+            </a:r>
+            <a:r>
+              <a:rPr lang="en-US" dirty="0" err="1"/>
+              <a:t>estimatable</a:t>
+            </a:r>
+            <a:r>
+              <a:rPr lang="en-US" dirty="0"/>
+              <a:t>) – As we will see in a bit, being able to estimate how long it will take to implement a user story is key to determining a reasonable scope for your project</a:t>
+            </a:r>
+          </a:p>
+          <a:p>
+            <a:endParaRPr lang="en-US" dirty="0"/>
+          </a:p>
+          <a:p>
+            <a:r>
+              <a:rPr lang="en-US" dirty="0"/>
+              <a:t>Small – In  the real world, a rule of thumb is to average 3-4 days of work per story for a full-time developer.  For our projects, it might be something a single student might be able to accomplish in a week, along with their other obligations as a student.</a:t>
+            </a:r>
+          </a:p>
+          <a:p>
+            <a:endParaRPr lang="en-US" dirty="0"/>
+          </a:p>
+          <a:p>
+            <a:r>
+              <a:rPr lang="en-US" dirty="0"/>
+              <a:t>Testable – There must be some way to judge completion: for the person implementing the software, and for the end-user. </a:t>
+            </a:r>
+          </a:p>
+          <a:p>
+            <a:endParaRPr lang="en-US" dirty="0"/>
+          </a:p>
+          <a:p>
+            <a:r>
+              <a:rPr lang="en-US" dirty="0"/>
+              <a:t>These </a:t>
+            </a:r>
+            <a:r>
+              <a:rPr lang="en-US" dirty="0" err="1"/>
+              <a:t>critera</a:t>
+            </a:r>
+            <a:r>
+              <a:rPr lang="en-US" dirty="0"/>
+              <a:t> tell you whether a user story is good at the </a:t>
+            </a:r>
+            <a:r>
+              <a:rPr lang="en-US" i="1" dirty="0"/>
+              <a:t>organizational level — </a:t>
+            </a:r>
+            <a:r>
+              <a:rPr lang="en-US" i="0" dirty="0"/>
+              <a:t>whether it’s useful to organize a software project. “Good” here doesn’t mean that the user story is worth doing, or ethical</a:t>
+            </a:r>
+            <a:endParaRPr lang="en-US" dirty="0"/>
+          </a:p>
+          <a:p>
+            <a:r>
+              <a:rPr lang="en-US" dirty="0"/>
+              <a:t>https://</a:t>
+            </a:r>
+            <a:r>
+              <a:rPr lang="en-US" dirty="0" err="1"/>
+              <a:t>agileforall.com</a:t>
+            </a:r>
+            <a:r>
+              <a:rPr lang="en-US" dirty="0"/>
+              <a:t>/new-to-agile-invest-in-good-user-stories/</a:t>
+            </a:r>
+          </a:p>
+          <a:p>
+            <a:endParaRPr lang="en-US" dirty="0"/>
+          </a:p>
+          <a:p>
+            <a:endParaRPr lang="en-US" dirty="0"/>
+          </a:p>
+          <a:p>
+            <a:pPr marL="0" marR="0" lvl="0" indent="0" algn="l" defTabSz="914400" rtl="0" eaLnBrk="1" fontAlgn="auto" latinLnBrk="0" hangingPunct="1">
+              <a:lnSpc>
+                <a:spcPct val="100000"/>
+              </a:lnSpc>
+              <a:spcBef>
+                <a:spcPts val="0"/>
+              </a:spcBef>
+              <a:spcAft>
+                <a:spcPts val="0"/>
+              </a:spcAft>
+              <a:buClrTx/>
+              <a:buSzTx/>
+              <a:buFontTx/>
+              <a:buNone/>
+              <a:tabLst/>
+              <a:defRPr/>
+            </a:pPr>
+            <a:r>
+              <a:rPr lang="en-US" dirty="0"/>
+              <a:t>… Let’s see an example and work through some of the tricky bits</a:t>
+            </a:r>
+          </a:p>
+        </p:txBody>
+      </p:sp>
+      <p:sp>
+        <p:nvSpPr>
+          <p:cNvPr id="4" name="Slide Number Placeholder 3"/>
+          <p:cNvSpPr>
+            <a:spLocks noGrp="1"/>
+          </p:cNvSpPr>
+          <p:nvPr>
+            <p:ph type="sldNum" sz="quarter" idx="5"/>
+          </p:nvPr>
+        </p:nvSpPr>
+        <p:spPr/>
+        <p:txBody>
+          <a:bodyPr/>
+          <a:lstStyle/>
+          <a:p>
+            <a:fld id="{07937F07-1250-4CCE-B198-1B2887014F41}" type="slidenum">
+              <a:rPr lang="en-US" smtClean="0"/>
+              <a:t>23</a:t>
+            </a:fld>
+            <a:endParaRPr lang="en-US"/>
+          </a:p>
+        </p:txBody>
+      </p:sp>
+    </p:spTree>
+    <p:extLst>
+      <p:ext uri="{BB962C8B-B14F-4D97-AF65-F5344CB8AC3E}">
+        <p14:creationId xmlns:p14="http://schemas.microsoft.com/office/powerpoint/2010/main" val="1695675977"/>
+      </p:ext>
+    </p:extLst>
+  </p:cSld>
+  <p:clrMapOvr>
+    <a:masterClrMapping/>
+  </p:clrMapOvr>
+</p:notes>
+</file>
+
+<file path=ppt/notesSlides/notesSlide21.xml><?xml version="1.0" encoding="utf-8"?>
+<p:notes xmlns:a="http://schemas.openxmlformats.org/drawingml/2006/main" xmlns:r="http://schemas.openxmlformats.org/officeDocument/2006/relationships" xmlns:p="http://schemas.openxmlformats.org/presentationml/2006/main">
+  <p:cSld>
+    <p:spTree>
+      <p:nvGrpSpPr>
+        <p:cNvPr id="1" name=""/>
+        <p:cNvGrpSpPr/>
+        <p:nvPr/>
+      </p:nvGrpSpPr>
+      <p:grpSpPr>
+        <a:xfrm>
+          <a:off x="0" y="0"/>
+          <a:ext cx="0" cy="0"/>
+          <a:chOff x="0" y="0"/>
+          <a:chExt cx="0" cy="0"/>
+        </a:xfrm>
+      </p:grpSpPr>
+      <p:sp>
+        <p:nvSpPr>
+          <p:cNvPr id="2" name="Slide Image Placeholder 1"/>
+          <p:cNvSpPr>
+            <a:spLocks noGrp="1" noRot="1" noChangeAspect="1"/>
+          </p:cNvSpPr>
+          <p:nvPr>
+            <p:ph type="sldImg"/>
+          </p:nvPr>
+        </p:nvSpPr>
+        <p:spPr/>
+      </p:sp>
+      <p:sp>
+        <p:nvSpPr>
+          <p:cNvPr id="3" name="Notes Placeholder 2"/>
+          <p:cNvSpPr>
+            <a:spLocks noGrp="1"/>
+          </p:cNvSpPr>
+          <p:nvPr>
+            <p:ph type="body" idx="1"/>
+          </p:nvPr>
+        </p:nvSpPr>
+        <p:spPr/>
+        <p:txBody>
+          <a:bodyPr/>
+          <a:lstStyle/>
+          <a:p>
+            <a:pPr marL="0" marR="0" lvl="0" indent="0" algn="l" defTabSz="914400" rtl="0" eaLnBrk="1" fontAlgn="auto" latinLnBrk="0" hangingPunct="1">
+              <a:lnSpc>
+                <a:spcPct val="100000"/>
+              </a:lnSpc>
+              <a:spcBef>
+                <a:spcPts val="0"/>
+              </a:spcBef>
+              <a:spcAft>
+                <a:spcPts val="0"/>
+              </a:spcAft>
+              <a:buClrTx/>
+              <a:buSzTx/>
+              <a:buFontTx/>
+              <a:buNone/>
+              <a:tabLst/>
+              <a:defRPr/>
+            </a:pPr>
+            <a:r>
+              <a:rPr lang="en-US" sz="3600" dirty="0"/>
+              <a:t>What we've talked about so far are called "functional requirements"-- the minimum functions that a system must be able to perform.</a:t>
+            </a:r>
+          </a:p>
+          <a:p>
+            <a:pPr marL="0" marR="0" lvl="0" indent="0" algn="l" defTabSz="914400" rtl="0" eaLnBrk="1" fontAlgn="auto" latinLnBrk="0" hangingPunct="1">
+              <a:lnSpc>
+                <a:spcPct val="100000"/>
+              </a:lnSpc>
+              <a:spcBef>
+                <a:spcPts val="0"/>
+              </a:spcBef>
+              <a:spcAft>
+                <a:spcPts val="0"/>
+              </a:spcAft>
+              <a:buClrTx/>
+              <a:buSzTx/>
+              <a:buFontTx/>
+              <a:buNone/>
+              <a:tabLst/>
+              <a:defRPr/>
+            </a:pPr>
+            <a:endParaRPr lang="en-US" sz="3600" dirty="0"/>
+          </a:p>
+          <a:p>
+            <a:pPr marL="0" marR="0" lvl="0" indent="0" algn="l" defTabSz="914400" rtl="0" eaLnBrk="1" fontAlgn="auto" latinLnBrk="0" hangingPunct="1">
+              <a:lnSpc>
+                <a:spcPct val="100000"/>
+              </a:lnSpc>
+              <a:spcBef>
+                <a:spcPts val="0"/>
+              </a:spcBef>
+              <a:spcAft>
+                <a:spcPts val="0"/>
+              </a:spcAft>
+              <a:buClrTx/>
+              <a:buSzTx/>
+              <a:buFontTx/>
+              <a:buNone/>
+              <a:tabLst/>
+              <a:defRPr/>
+            </a:pPr>
+            <a:r>
+              <a:rPr lang="en-US" sz="3600" dirty="0"/>
+              <a:t>But there are other kinds of requirements.  These are called "non-functional" requirements.</a:t>
+            </a:r>
+          </a:p>
+          <a:p>
+            <a:pPr marL="0" marR="0" lvl="0" indent="0" algn="l" defTabSz="914400" rtl="0" eaLnBrk="1" fontAlgn="auto" latinLnBrk="0" hangingPunct="1">
+              <a:lnSpc>
+                <a:spcPct val="100000"/>
+              </a:lnSpc>
+              <a:spcBef>
+                <a:spcPts val="0"/>
+              </a:spcBef>
+              <a:spcAft>
+                <a:spcPts val="0"/>
+              </a:spcAft>
+              <a:buClrTx/>
+              <a:buSzTx/>
+              <a:buFontTx/>
+              <a:buNone/>
+              <a:tabLst/>
+              <a:defRPr/>
+            </a:pPr>
+            <a:endParaRPr lang="en-US" sz="3600" dirty="0"/>
+          </a:p>
+          <a:p>
+            <a:pPr marL="0" marR="0" lvl="0" indent="0" algn="l" defTabSz="914400" rtl="0" eaLnBrk="1" fontAlgn="auto" latinLnBrk="0" hangingPunct="1">
+              <a:lnSpc>
+                <a:spcPct val="100000"/>
+              </a:lnSpc>
+              <a:spcBef>
+                <a:spcPts val="0"/>
+              </a:spcBef>
+              <a:spcAft>
+                <a:spcPts val="0"/>
+              </a:spcAft>
+              <a:buClrTx/>
+              <a:buSzTx/>
+              <a:buFontTx/>
+              <a:buNone/>
+              <a:tabLst/>
+              <a:defRPr/>
+            </a:pPr>
+            <a:r>
+              <a:rPr lang="en-US" sz="3600" dirty="0"/>
+              <a:t>Non-functional requirements capture the </a:t>
+            </a:r>
+            <a:r>
+              <a:rPr lang="en-US" sz="3600" i="1" dirty="0"/>
+              <a:t>quality goals</a:t>
+            </a:r>
+            <a:r>
+              <a:rPr lang="en-US" sz="3600" i="0" dirty="0"/>
+              <a:t> of a system. </a:t>
+            </a:r>
+            <a:endParaRPr lang="en-US" sz="3600" dirty="0"/>
+          </a:p>
+          <a:p>
+            <a:pPr marL="0" marR="0" lvl="0" indent="0" algn="l" defTabSz="914400" rtl="0" eaLnBrk="1" fontAlgn="auto" latinLnBrk="0" hangingPunct="1">
+              <a:lnSpc>
+                <a:spcPct val="100000"/>
+              </a:lnSpc>
+              <a:spcBef>
+                <a:spcPts val="0"/>
+              </a:spcBef>
+              <a:spcAft>
+                <a:spcPts val="0"/>
+              </a:spcAft>
+              <a:buClrTx/>
+              <a:buSzTx/>
+              <a:buFontTx/>
+              <a:buNone/>
+              <a:tabLst/>
+              <a:defRPr/>
+            </a:pPr>
+            <a:endParaRPr lang="en-US" sz="3600" dirty="0"/>
+          </a:p>
+          <a:p>
+            <a:pPr marL="0" marR="0" lvl="0" indent="0" algn="l" defTabSz="914400" rtl="0" eaLnBrk="1" fontAlgn="auto" latinLnBrk="0" hangingPunct="1">
+              <a:lnSpc>
+                <a:spcPct val="100000"/>
+              </a:lnSpc>
+              <a:spcBef>
+                <a:spcPts val="0"/>
+              </a:spcBef>
+              <a:spcAft>
+                <a:spcPts val="0"/>
+              </a:spcAft>
+              <a:buClrTx/>
+              <a:buSzTx/>
+              <a:buFontTx/>
+              <a:buNone/>
+              <a:tabLst/>
+              <a:defRPr/>
+            </a:pPr>
+            <a:r>
+              <a:rPr lang="en-US" sz="3600" dirty="0"/>
+              <a:t>Here are some obvious ones  &lt;read slide&gt;</a:t>
+            </a:r>
+          </a:p>
+          <a:p>
+            <a:pPr marL="0" marR="0" lvl="0" indent="0" algn="l" defTabSz="914400" rtl="0" eaLnBrk="1" fontAlgn="auto" latinLnBrk="0" hangingPunct="1">
+              <a:lnSpc>
+                <a:spcPct val="100000"/>
+              </a:lnSpc>
+              <a:spcBef>
+                <a:spcPts val="0"/>
+              </a:spcBef>
+              <a:spcAft>
+                <a:spcPts val="0"/>
+              </a:spcAft>
+              <a:buClrTx/>
+              <a:buSzTx/>
+              <a:buFontTx/>
+              <a:buNone/>
+              <a:tabLst/>
+              <a:defRPr/>
+            </a:pPr>
+            <a:endParaRPr lang="en-US" sz="3600" dirty="0"/>
+          </a:p>
+          <a:p>
+            <a:pPr marL="0" marR="0" lvl="0" indent="0" algn="l" defTabSz="914400" rtl="0" eaLnBrk="1" fontAlgn="auto" latinLnBrk="0" hangingPunct="1">
+              <a:lnSpc>
+                <a:spcPct val="100000"/>
+              </a:lnSpc>
+              <a:spcBef>
+                <a:spcPts val="0"/>
+              </a:spcBef>
+              <a:spcAft>
+                <a:spcPts val="0"/>
+              </a:spcAft>
+              <a:buClrTx/>
+              <a:buSzTx/>
+              <a:buFontTx/>
+              <a:buNone/>
+              <a:tabLst/>
+              <a:defRPr/>
+            </a:pPr>
+            <a:endParaRPr lang="en-US" sz="3600" dirty="0"/>
+          </a:p>
+          <a:p>
+            <a:pPr marL="0" marR="0" lvl="0" indent="0" algn="l" defTabSz="914400" rtl="0" eaLnBrk="1" fontAlgn="auto" latinLnBrk="0" hangingPunct="1">
+              <a:lnSpc>
+                <a:spcPct val="100000"/>
+              </a:lnSpc>
+              <a:spcBef>
+                <a:spcPts val="0"/>
+              </a:spcBef>
+              <a:spcAft>
+                <a:spcPts val="0"/>
+              </a:spcAft>
+              <a:buClrTx/>
+              <a:buSzTx/>
+              <a:buFontTx/>
+              <a:buNone/>
+              <a:tabLst/>
+              <a:defRPr/>
+            </a:pPr>
+            <a:endParaRPr lang="en-US" sz="3600" dirty="0"/>
+          </a:p>
+        </p:txBody>
+      </p:sp>
+      <p:sp>
+        <p:nvSpPr>
+          <p:cNvPr id="4" name="Slide Number Placeholder 3"/>
+          <p:cNvSpPr>
+            <a:spLocks noGrp="1"/>
+          </p:cNvSpPr>
+          <p:nvPr>
+            <p:ph type="sldNum" sz="quarter" idx="5"/>
+          </p:nvPr>
+        </p:nvSpPr>
+        <p:spPr/>
+        <p:txBody>
+          <a:bodyPr/>
+          <a:lstStyle/>
+          <a:p>
+            <a:fld id="{07937F07-1250-4CCE-B198-1B2887014F41}" type="slidenum">
+              <a:rPr lang="en-US" smtClean="0"/>
+              <a:t>24</a:t>
+            </a:fld>
+            <a:endParaRPr lang="en-US" dirty="0"/>
+          </a:p>
+        </p:txBody>
+      </p:sp>
+    </p:spTree>
+    <p:extLst>
+      <p:ext uri="{BB962C8B-B14F-4D97-AF65-F5344CB8AC3E}">
+        <p14:creationId xmlns:p14="http://schemas.microsoft.com/office/powerpoint/2010/main" val="1345260318"/>
+      </p:ext>
+    </p:extLst>
+  </p:cSld>
+  <p:clrMapOvr>
+    <a:masterClrMapping/>
+  </p:clrMapOvr>
+</p:notes>
+</file>
+
+<file path=ppt/notesSlides/notesSlide22.xml><?xml version="1.0" encoding="utf-8"?>
 <p:notes xmlns:a="http://schemas.openxmlformats.org/drawingml/2006/main" xmlns:r="http://schemas.openxmlformats.org/officeDocument/2006/relationships" xmlns:p="http://schemas.openxmlformats.org/presentationml/2006/main">
   <p:cSld>
     <p:spTree>
@@ -2705,7 +2910,7 @@
 </p:notes>
 </file>
 
-<file path=ppt/notesSlides/notesSlide21.xml><?xml version="1.0" encoding="utf-8"?>
+<file path=ppt/notesSlides/notesSlide23.xml><?xml version="1.0" encoding="utf-8"?>
 <p:notes xmlns:a="http://schemas.openxmlformats.org/drawingml/2006/main" xmlns:r="http://schemas.openxmlformats.org/officeDocument/2006/relationships" xmlns:p="http://schemas.openxmlformats.org/presentationml/2006/main">
   <p:cSld>
     <p:spTree>
@@ -2844,7 +3049,7 @@
 </p:notes>
 </file>
 
-<file path=ppt/notesSlides/notesSlide22.xml><?xml version="1.0" encoding="utf-8"?>
+<file path=ppt/notesSlides/notesSlide24.xml><?xml version="1.0" encoding="utf-8"?>
 <p:notes xmlns:a="http://schemas.openxmlformats.org/drawingml/2006/main" xmlns:r="http://schemas.openxmlformats.org/officeDocument/2006/relationships" xmlns:p="http://schemas.openxmlformats.org/presentationml/2006/main">
   <p:cSld>
     <p:spTree>
@@ -3762,7 +3967,7 @@
           <a:p>
             <a:r>
               <a:rPr lang="en-US" dirty="0"/>
-              <a:t>A user story is a short simple description of ONE feature that can fit on a 3x5” card, written in the user’s language.</a:t>
+              <a:t>A user story is a short simple description of ONE thing that the user would like to do, written in the user's language. "Short and simple" means that it can fit on a 3x5” We'll say more about this later.</a:t>
             </a:r>
           </a:p>
           <a:p>
@@ -4420,7 +4625,7 @@
           <a:p>
             <a:fld id="{5D2A64DE-480B-420F-9649-4F8E696E08E0}" type="datetime1">
               <a:rPr lang="en-US" smtClean="0"/>
-              <a:t>1/4/2026</a:t>
+              <a:t>1/7/2026</a:t>
             </a:fld>
             <a:endParaRPr lang="en-US"/>
           </a:p>
@@ -4744,7 +4949,7 @@
           <a:p>
             <a:fld id="{EA476A42-A091-4468-A075-64A31BE59948}" type="datetime1">
               <a:rPr lang="en-US" smtClean="0"/>
-              <a:t>1/4/2026</a:t>
+              <a:t>1/7/2026</a:t>
             </a:fld>
             <a:endParaRPr lang="en-US"/>
           </a:p>
@@ -4942,7 +5147,7 @@
           <a:p>
             <a:fld id="{0D3616D0-8311-4107-9726-6B805E7D05BA}" type="datetime1">
               <a:rPr lang="en-US" smtClean="0"/>
-              <a:t>1/4/2026</a:t>
+              <a:t>1/7/2026</a:t>
             </a:fld>
             <a:endParaRPr lang="en-US"/>
           </a:p>
@@ -5150,7 +5355,7 @@
           <a:p>
             <a:fld id="{3BC2557A-5C88-417A-A763-5AC779462A5F}" type="datetime1">
               <a:rPr lang="en-US" smtClean="0"/>
-              <a:t>1/4/2026</a:t>
+              <a:t>1/7/2026</a:t>
             </a:fld>
             <a:endParaRPr lang="en-US"/>
           </a:p>
@@ -5674,7 +5879,7 @@
           <a:p>
             <a:fld id="{07C7BFD4-467E-4EDE-93EA-052F5B39A4E5}" type="datetime1">
               <a:rPr lang="en-US" smtClean="0"/>
-              <a:t>1/4/2026</a:t>
+              <a:t>1/7/2026</a:t>
             </a:fld>
             <a:endParaRPr lang="en-US"/>
           </a:p>
@@ -5924,7 +6129,7 @@
           <a:p>
             <a:fld id="{07C7BFD4-467E-4EDE-93EA-052F5B39A4E5}" type="datetime1">
               <a:rPr lang="en-US" smtClean="0"/>
-              <a:t>1/4/2026</a:t>
+              <a:t>1/7/2026</a:t>
             </a:fld>
             <a:endParaRPr lang="en-US"/>
           </a:p>
@@ -6106,7 +6311,7 @@
           <a:p>
             <a:fld id="{109E55A0-C911-4F03-82FC-7E5926047D46}" type="datetime1">
               <a:rPr lang="en-US" smtClean="0"/>
-              <a:t>1/4/2026</a:t>
+              <a:t>1/7/2026</a:t>
             </a:fld>
             <a:endParaRPr lang="en-US"/>
           </a:p>
@@ -6419,7 +6624,7 @@
           <a:p>
             <a:fld id="{A533CBE2-D5BE-47AC-ADC2-9CDFC1D0CF90}" type="datetime1">
               <a:rPr lang="en-US" smtClean="0"/>
-              <a:t>1/4/2026</a:t>
+              <a:t>1/7/2026</a:t>
             </a:fld>
             <a:endParaRPr lang="en-US"/>
           </a:p>
@@ -6720,7 +6925,7 @@
           <a:p>
             <a:fld id="{39B7EDB1-CE74-4951-85A2-0B01C2128E28}" type="datetime1">
               <a:rPr lang="en-US" smtClean="0"/>
-              <a:t>1/4/2026</a:t>
+              <a:t>1/7/2026</a:t>
             </a:fld>
             <a:endParaRPr lang="en-US"/>
           </a:p>
@@ -7168,7 +7373,7 @@
           <a:p>
             <a:fld id="{2BC7EB92-A5C2-4807-A9DC-9EDE6CBFB241}" type="datetime1">
               <a:rPr lang="en-US" smtClean="0"/>
-              <a:t>1/4/2026</a:t>
+              <a:t>1/7/2026</a:t>
             </a:fld>
             <a:endParaRPr lang="en-US"/>
           </a:p>
@@ -7281,7 +7486,7 @@
           <a:p>
             <a:fld id="{2B7B7EE0-7771-4CD5-9B2B-3550753A54A1}" type="datetime1">
               <a:rPr lang="en-US" smtClean="0"/>
-              <a:t>1/4/2026</a:t>
+              <a:t>1/7/2026</a:t>
             </a:fld>
             <a:endParaRPr lang="en-US"/>
           </a:p>
@@ -7592,7 +7797,7 @@
           <a:p>
             <a:fld id="{F8B318B3-0E87-4416-A9B8-D891968C2727}" type="datetime1">
               <a:rPr lang="en-US" smtClean="0"/>
-              <a:t>1/4/2026</a:t>
+              <a:t>1/7/2026</a:t>
             </a:fld>
             <a:endParaRPr lang="en-US"/>
           </a:p>
@@ -7833,7 +8038,7 @@
           <a:p>
             <a:fld id="{54D997E8-DDEE-43F1-8D9B-F8A1E11DE488}" type="datetime1">
               <a:rPr lang="en-US" smtClean="0"/>
-              <a:t>1/4/2026</a:t>
+              <a:t>1/7/2026</a:t>
             </a:fld>
             <a:endParaRPr lang="en-US"/>
           </a:p>

</xml_diff>